<commit_message>
add code for factors
</commit_message>
<xml_diff>
--- a/code/02_wrangling_data.pptx
+++ b/code/02_wrangling_data.pptx
@@ -6,12 +6,12 @@
   </p:sldMasterIdLst>
   <p:sldIdLst>
     <p:sldId id="261" r:id="rId2"/>
-    <p:sldId id="270" r:id="rId3"/>
-    <p:sldId id="260" r:id="rId4"/>
-    <p:sldId id="264" r:id="rId5"/>
-    <p:sldId id="271" r:id="rId6"/>
-    <p:sldId id="274" r:id="rId7"/>
-    <p:sldId id="275" r:id="rId8"/>
+    <p:sldId id="275" r:id="rId3"/>
+    <p:sldId id="270" r:id="rId4"/>
+    <p:sldId id="260" r:id="rId5"/>
+    <p:sldId id="264" r:id="rId6"/>
+    <p:sldId id="271" r:id="rId7"/>
+    <p:sldId id="274" r:id="rId8"/>
     <p:sldId id="266" r:id="rId9"/>
     <p:sldId id="269" r:id="rId10"/>
     <p:sldId id="272" r:id="rId11"/>
@@ -287,7 +287,7 @@
           <a:p>
             <a:fld id="{5FCDCD17-B0B1-A244-9BB5-D7228F76BED7}" type="datetime3">
               <a:rPr lang="en-SG" smtClean="0"/>
-              <a:t>9 April 2023</a:t>
+              <a:t>10 April 2023</a:t>
             </a:fld>
             <a:endParaRPr lang="en-US" dirty="0"/>
           </a:p>
@@ -502,7 +502,7 @@
           <a:p>
             <a:fld id="{ADD28603-00EC-3A4D-B44A-BEF0A0F382C6}" type="datetime3">
               <a:rPr lang="en-SG" smtClean="0"/>
-              <a:t>9 April 2023</a:t>
+              <a:t>10 April 2023</a:t>
             </a:fld>
             <a:endParaRPr lang="en-US"/>
           </a:p>
@@ -833,7 +833,7 @@
           <a:p>
             <a:fld id="{E6645DC1-DD2E-5147-813A-145518F6A88E}" type="datetime3">
               <a:rPr lang="en-SG" smtClean="0"/>
-              <a:t>9 April 2023</a:t>
+              <a:t>10 April 2023</a:t>
             </a:fld>
             <a:endParaRPr lang="en-US"/>
           </a:p>
@@ -1134,7 +1134,7 @@
           <a:p>
             <a:fld id="{9CE5D27D-0906-C849-85EF-1698976BF415}" type="datetime3">
               <a:rPr lang="en-SG" smtClean="0"/>
-              <a:t>9 April 2023</a:t>
+              <a:t>10 April 2023</a:t>
             </a:fld>
             <a:endParaRPr lang="en-US"/>
           </a:p>
@@ -1589,7 +1589,7 @@
           <a:p>
             <a:fld id="{B644A007-AED7-CC4E-A6C9-9429041AE4C9}" type="datetime3">
               <a:rPr lang="en-SG" smtClean="0"/>
-              <a:t>9 April 2023</a:t>
+              <a:t>10 April 2023</a:t>
             </a:fld>
             <a:endParaRPr lang="en-US"/>
           </a:p>
@@ -1821,7 +1821,7 @@
           <a:p>
             <a:fld id="{06911E40-0033-E74E-A93D-D0B3F4840C2B}" type="datetime3">
               <a:rPr lang="en-SG" smtClean="0"/>
-              <a:t>9 April 2023</a:t>
+              <a:t>10 April 2023</a:t>
             </a:fld>
             <a:endParaRPr lang="en-US"/>
           </a:p>
@@ -1964,7 +1964,7 @@
           <a:p>
             <a:fld id="{FDD5ADF8-FB30-A140-BC76-B82B3346A618}" type="datetime3">
               <a:rPr lang="en-SG" smtClean="0"/>
-              <a:t>9 April 2023</a:t>
+              <a:t>10 April 2023</a:t>
             </a:fld>
             <a:endParaRPr lang="en-US"/>
           </a:p>
@@ -2307,7 +2307,7 @@
           <a:p>
             <a:fld id="{2EF13291-2998-1E45-BB6C-14491E304C83}" type="datetime3">
               <a:rPr lang="en-SG" smtClean="0"/>
-              <a:t>9 April 2023</a:t>
+              <a:t>10 April 2023</a:t>
             </a:fld>
             <a:endParaRPr lang="en-US"/>
           </a:p>
@@ -2626,7 +2626,7 @@
           <a:p>
             <a:fld id="{7BDC71DE-80FC-B640-A19E-6715081E17F0}" type="datetime3">
               <a:rPr lang="en-SG" smtClean="0"/>
-              <a:t>9 April 2023</a:t>
+              <a:t>10 April 2023</a:t>
             </a:fld>
             <a:endParaRPr lang="en-US"/>
           </a:p>
@@ -2905,7 +2905,7 @@
             <a:fld id="{39E2CDA4-D7DD-D048-900A-DFEB5E81218B}" type="datetime3">
               <a:rPr lang="en-SG" smtClean="0"/>
               <a:pPr/>
-              <a:t>9 April 2023</a:t>
+              <a:t>10 April 2023</a:t>
             </a:fld>
             <a:endParaRPr lang="en-US" dirty="0"/>
           </a:p>
@@ -4511,6 +4511,175 @@
           <a:chExt cx="0" cy="0"/>
         </a:xfrm>
       </p:grpSpPr>
+      <p:sp>
+        <p:nvSpPr>
+          <p:cNvPr id="2" name="Title 1">
+            <a:extLst>
+              <a:ext uri="{FF2B5EF4-FFF2-40B4-BE49-F238E27FC236}">
+                <a16:creationId xmlns:a16="http://schemas.microsoft.com/office/drawing/2014/main" id="{FABC45D1-4AD1-553C-14F2-66A79408C91F}"/>
+              </a:ext>
+            </a:extLst>
+          </p:cNvPr>
+          <p:cNvSpPr>
+            <a:spLocks noGrp="1"/>
+          </p:cNvSpPr>
+          <p:nvPr>
+            <p:ph type="title"/>
+          </p:nvPr>
+        </p:nvSpPr>
+        <p:spPr/>
+        <p:txBody>
+          <a:bodyPr/>
+          <a:lstStyle/>
+          <a:p>
+            <a:r>
+              <a:rPr lang="en-US" dirty="0"/>
+              <a:t>Learning objectives</a:t>
+            </a:r>
+          </a:p>
+        </p:txBody>
+      </p:sp>
+      <p:sp>
+        <p:nvSpPr>
+          <p:cNvPr id="3" name="Content Placeholder 2">
+            <a:extLst>
+              <a:ext uri="{FF2B5EF4-FFF2-40B4-BE49-F238E27FC236}">
+                <a16:creationId xmlns:a16="http://schemas.microsoft.com/office/drawing/2014/main" id="{0C90A503-D318-956E-8EE5-31D77D9579BB}"/>
+              </a:ext>
+            </a:extLst>
+          </p:cNvPr>
+          <p:cNvSpPr>
+            <a:spLocks noGrp="1"/>
+          </p:cNvSpPr>
+          <p:nvPr>
+            <p:ph idx="1"/>
+          </p:nvPr>
+        </p:nvSpPr>
+        <p:spPr/>
+        <p:txBody>
+          <a:bodyPr/>
+          <a:lstStyle/>
+          <a:p>
+            <a:pPr marL="0" indent="0">
+              <a:buNone/>
+            </a:pPr>
+            <a:r>
+              <a:rPr lang="en-US" dirty="0"/>
+              <a:t>To understand:</a:t>
+            </a:r>
+          </a:p>
+          <a:p>
+            <a:pPr marL="457200" indent="-457200">
+              <a:buFont typeface="+mj-lt"/>
+              <a:buAutoNum type="arabicPeriod"/>
+            </a:pPr>
+            <a:r>
+              <a:rPr lang="en-US" dirty="0"/>
+              <a:t>What is tidy data in R?</a:t>
+            </a:r>
+          </a:p>
+          <a:p>
+            <a:pPr marL="457200" indent="-457200">
+              <a:buFont typeface="+mj-lt"/>
+              <a:buAutoNum type="arabicPeriod"/>
+            </a:pPr>
+            <a:r>
+              <a:rPr lang="en-US" dirty="0"/>
+              <a:t>How to read a CSV file</a:t>
+            </a:r>
+          </a:p>
+          <a:p>
+            <a:pPr marL="457200" indent="-457200">
+              <a:buFont typeface="+mj-lt"/>
+              <a:buAutoNum type="arabicPeriod"/>
+            </a:pPr>
+            <a:r>
+              <a:rPr lang="en-US" dirty="0"/>
+              <a:t>The concept of tidy data</a:t>
+            </a:r>
+          </a:p>
+          <a:p>
+            <a:pPr marL="457200" indent="-457200">
+              <a:buFont typeface="+mj-lt"/>
+              <a:buAutoNum type="arabicPeriod"/>
+            </a:pPr>
+            <a:r>
+              <a:rPr lang="en-US" dirty="0"/>
+              <a:t>How to select columns and filter rows in a </a:t>
+            </a:r>
+            <a:r>
+              <a:rPr lang="en-US" dirty="0" err="1"/>
+              <a:t>dataframe</a:t>
+            </a:r>
+            <a:endParaRPr lang="en-US" dirty="0"/>
+          </a:p>
+          <a:p>
+            <a:pPr marL="457200" indent="-457200">
+              <a:buFont typeface="+mj-lt"/>
+              <a:buAutoNum type="arabicPeriod"/>
+            </a:pPr>
+            <a:r>
+              <a:rPr lang="en-US" dirty="0"/>
+              <a:t>How to use pipe</a:t>
+            </a:r>
+          </a:p>
+          <a:p>
+            <a:pPr marL="457200" indent="-457200">
+              <a:buFont typeface="+mj-lt"/>
+              <a:buAutoNum type="arabicPeriod"/>
+            </a:pPr>
+            <a:r>
+              <a:rPr lang="en-US" dirty="0"/>
+              <a:t>How to create new columns in a </a:t>
+            </a:r>
+            <a:r>
+              <a:rPr lang="en-US" dirty="0" err="1"/>
+              <a:t>dataframe</a:t>
+            </a:r>
+            <a:endParaRPr lang="en-US" dirty="0"/>
+          </a:p>
+          <a:p>
+            <a:pPr marL="457200" indent="-457200">
+              <a:buFont typeface="+mj-lt"/>
+              <a:buAutoNum type="arabicPeriod"/>
+            </a:pPr>
+            <a:r>
+              <a:rPr lang="en-US" dirty="0"/>
+              <a:t>How to aggregate data using summary statistics</a:t>
+            </a:r>
+          </a:p>
+        </p:txBody>
+      </p:sp>
+    </p:spTree>
+    <p:extLst>
+      <p:ext uri="{BB962C8B-B14F-4D97-AF65-F5344CB8AC3E}">
+        <p14:creationId xmlns:p14="http://schemas.microsoft.com/office/powerpoint/2010/main" val="787414212"/>
+      </p:ext>
+    </p:extLst>
+  </p:cSld>
+  <p:clrMapOvr>
+    <a:masterClrMapping/>
+  </p:clrMapOvr>
+</p:sld>
+</file>
+
+<file path=ppt/slides/slide3.xml><?xml version="1.0" encoding="utf-8"?>
+<p:sld xmlns:a="http://schemas.openxmlformats.org/drawingml/2006/main" xmlns:r="http://schemas.openxmlformats.org/officeDocument/2006/relationships" xmlns:p="http://schemas.openxmlformats.org/presentationml/2006/main">
+  <p:cSld>
+    <p:spTree>
+      <p:nvGrpSpPr>
+        <p:cNvPr id="1" name=""/>
+        <p:cNvGrpSpPr/>
+        <p:nvPr/>
+      </p:nvGrpSpPr>
+      <p:grpSpPr>
+        <a:xfrm>
+          <a:off x="0" y="0"/>
+          <a:ext cx="0" cy="0"/>
+          <a:chOff x="0" y="0"/>
+          <a:chExt cx="0" cy="0"/>
+        </a:xfrm>
+      </p:grpSpPr>
       <p:pic>
         <p:nvPicPr>
           <p:cNvPr id="1026" name="Picture 2" descr="Cute fuzzy monsters putting rectangular data tables onto a conveyor belt. Along the conveyor belt line are different automated “stations” that update the data, reading “WRANGLE”, “VISUALIZE”, and “MODEL”. A monster at the end of the conveyor belt is carrying away a table that reads “Complete analysis.”">
@@ -4571,7 +4740,7 @@
 </p:sld>
 </file>
 
-<file path=ppt/slides/slide3.xml><?xml version="1.0" encoding="utf-8"?>
+<file path=ppt/slides/slide4.xml><?xml version="1.0" encoding="utf-8"?>
 <p:sld xmlns:a="http://schemas.openxmlformats.org/drawingml/2006/main" xmlns:r="http://schemas.openxmlformats.org/officeDocument/2006/relationships" xmlns:p="http://schemas.openxmlformats.org/presentationml/2006/main">
   <p:cSld>
     <p:spTree>
@@ -4648,7 +4817,7 @@
 </p:sld>
 </file>
 
-<file path=ppt/slides/slide4.xml><?xml version="1.0" encoding="utf-8"?>
+<file path=ppt/slides/slide5.xml><?xml version="1.0" encoding="utf-8"?>
 <p:sld xmlns:a="http://schemas.openxmlformats.org/drawingml/2006/main" xmlns:r="http://schemas.openxmlformats.org/officeDocument/2006/relationships" xmlns:p="http://schemas.openxmlformats.org/presentationml/2006/main">
   <p:cSld>
     <p:spTree>
@@ -7348,7 +7517,7 @@
 </p:sld>
 </file>
 
-<file path=ppt/slides/slide5.xml><?xml version="1.0" encoding="utf-8"?>
+<file path=ppt/slides/slide6.xml><?xml version="1.0" encoding="utf-8"?>
 <p:sld xmlns:a="http://schemas.openxmlformats.org/drawingml/2006/main" xmlns:r="http://schemas.openxmlformats.org/officeDocument/2006/relationships" xmlns:p="http://schemas.openxmlformats.org/presentationml/2006/main">
   <p:cSld>
     <p:spTree>
@@ -7425,7 +7594,7 @@
 </p:sld>
 </file>
 
-<file path=ppt/slides/slide6.xml><?xml version="1.0" encoding="utf-8"?>
+<file path=ppt/slides/slide7.xml><?xml version="1.0" encoding="utf-8"?>
 <p:sld xmlns:a="http://schemas.openxmlformats.org/drawingml/2006/main" xmlns:r="http://schemas.openxmlformats.org/officeDocument/2006/relationships" xmlns:p="http://schemas.openxmlformats.org/presentationml/2006/main">
   <p:cSld>
     <p:spTree>
@@ -7521,173 +7690,6 @@
     <p:extLst>
       <p:ext uri="{BB962C8B-B14F-4D97-AF65-F5344CB8AC3E}">
         <p14:creationId xmlns:p14="http://schemas.microsoft.com/office/powerpoint/2010/main" val="1839798407"/>
-      </p:ext>
-    </p:extLst>
-  </p:cSld>
-  <p:clrMapOvr>
-    <a:masterClrMapping/>
-  </p:clrMapOvr>
-</p:sld>
-</file>
-
-<file path=ppt/slides/slide7.xml><?xml version="1.0" encoding="utf-8"?>
-<p:sld xmlns:a="http://schemas.openxmlformats.org/drawingml/2006/main" xmlns:r="http://schemas.openxmlformats.org/officeDocument/2006/relationships" xmlns:p="http://schemas.openxmlformats.org/presentationml/2006/main">
-  <p:cSld>
-    <p:spTree>
-      <p:nvGrpSpPr>
-        <p:cNvPr id="1" name=""/>
-        <p:cNvGrpSpPr/>
-        <p:nvPr/>
-      </p:nvGrpSpPr>
-      <p:grpSpPr>
-        <a:xfrm>
-          <a:off x="0" y="0"/>
-          <a:ext cx="0" cy="0"/>
-          <a:chOff x="0" y="0"/>
-          <a:chExt cx="0" cy="0"/>
-        </a:xfrm>
-      </p:grpSpPr>
-      <p:sp>
-        <p:nvSpPr>
-          <p:cNvPr id="2" name="Title 1">
-            <a:extLst>
-              <a:ext uri="{FF2B5EF4-FFF2-40B4-BE49-F238E27FC236}">
-                <a16:creationId xmlns:a16="http://schemas.microsoft.com/office/drawing/2014/main" id="{FABC45D1-4AD1-553C-14F2-66A79408C91F}"/>
-              </a:ext>
-            </a:extLst>
-          </p:cNvPr>
-          <p:cNvSpPr>
-            <a:spLocks noGrp="1"/>
-          </p:cNvSpPr>
-          <p:nvPr>
-            <p:ph type="title"/>
-          </p:nvPr>
-        </p:nvSpPr>
-        <p:spPr/>
-        <p:txBody>
-          <a:bodyPr/>
-          <a:lstStyle/>
-          <a:p>
-            <a:r>
-              <a:rPr lang="en-US" dirty="0"/>
-              <a:t>Learning objectives</a:t>
-            </a:r>
-          </a:p>
-        </p:txBody>
-      </p:sp>
-      <p:sp>
-        <p:nvSpPr>
-          <p:cNvPr id="3" name="Content Placeholder 2">
-            <a:extLst>
-              <a:ext uri="{FF2B5EF4-FFF2-40B4-BE49-F238E27FC236}">
-                <a16:creationId xmlns:a16="http://schemas.microsoft.com/office/drawing/2014/main" id="{0C90A503-D318-956E-8EE5-31D77D9579BB}"/>
-              </a:ext>
-            </a:extLst>
-          </p:cNvPr>
-          <p:cNvSpPr>
-            <a:spLocks noGrp="1"/>
-          </p:cNvSpPr>
-          <p:nvPr>
-            <p:ph idx="1"/>
-          </p:nvPr>
-        </p:nvSpPr>
-        <p:spPr/>
-        <p:txBody>
-          <a:bodyPr/>
-          <a:lstStyle/>
-          <a:p>
-            <a:pPr marL="0" indent="0">
-              <a:buNone/>
-            </a:pPr>
-            <a:r>
-              <a:rPr lang="en-US" dirty="0"/>
-              <a:t>To understand:</a:t>
-            </a:r>
-          </a:p>
-          <a:p>
-            <a:pPr marL="457200" indent="-457200">
-              <a:buFont typeface="+mj-lt"/>
-              <a:buAutoNum type="arabicPeriod"/>
-            </a:pPr>
-            <a:r>
-              <a:rPr lang="en-US" dirty="0"/>
-              <a:t>How to read a CSV file</a:t>
-            </a:r>
-          </a:p>
-          <a:p>
-            <a:pPr marL="457200" indent="-457200">
-              <a:buFont typeface="+mj-lt"/>
-              <a:buAutoNum type="arabicPeriod"/>
-            </a:pPr>
-            <a:r>
-              <a:rPr lang="en-US" dirty="0"/>
-              <a:t>The concept of tidy data</a:t>
-            </a:r>
-          </a:p>
-          <a:p>
-            <a:pPr marL="457200" indent="-457200">
-              <a:buFont typeface="+mj-lt"/>
-              <a:buAutoNum type="arabicPeriod"/>
-            </a:pPr>
-            <a:r>
-              <a:rPr lang="en-US" dirty="0"/>
-              <a:t>How to select columns and filter rows in a </a:t>
-            </a:r>
-            <a:r>
-              <a:rPr lang="en-US" dirty="0" err="1"/>
-              <a:t>dataframe</a:t>
-            </a:r>
-            <a:endParaRPr lang="en-US" dirty="0"/>
-          </a:p>
-          <a:p>
-            <a:pPr marL="457200" indent="-457200">
-              <a:buFont typeface="+mj-lt"/>
-              <a:buAutoNum type="arabicPeriod"/>
-            </a:pPr>
-            <a:r>
-              <a:rPr lang="en-US" dirty="0"/>
-              <a:t>How to use pipe</a:t>
-            </a:r>
-          </a:p>
-          <a:p>
-            <a:pPr marL="457200" indent="-457200">
-              <a:buFont typeface="+mj-lt"/>
-              <a:buAutoNum type="arabicPeriod"/>
-            </a:pPr>
-            <a:r>
-              <a:rPr lang="en-US" dirty="0"/>
-              <a:t>How to create new columns in a </a:t>
-            </a:r>
-            <a:r>
-              <a:rPr lang="en-US" dirty="0" err="1"/>
-              <a:t>dataframe</a:t>
-            </a:r>
-            <a:endParaRPr lang="en-US" dirty="0"/>
-          </a:p>
-          <a:p>
-            <a:pPr marL="457200" indent="-457200">
-              <a:buFont typeface="+mj-lt"/>
-              <a:buAutoNum type="arabicPeriod"/>
-            </a:pPr>
-            <a:r>
-              <a:rPr lang="en-US" dirty="0"/>
-              <a:t>How to aggregate </a:t>
-            </a:r>
-            <a:r>
-              <a:rPr lang="en-US"/>
-              <a:t>data using </a:t>
-            </a:r>
-            <a:r>
-              <a:rPr lang="en-US" dirty="0"/>
-              <a:t>summary statistics</a:t>
-            </a:r>
-          </a:p>
-        </p:txBody>
-      </p:sp>
-    </p:spTree>
-    <p:extLst>
-      <p:ext uri="{BB962C8B-B14F-4D97-AF65-F5344CB8AC3E}">
-        <p14:creationId xmlns:p14="http://schemas.microsoft.com/office/powerpoint/2010/main" val="3765878996"/>
       </p:ext>
     </p:extLst>
   </p:cSld>

</xml_diff>